<commit_message>
AutoCommit_5 октября 2023 г. 19:04:55_SibNout2023
</commit_message>
<xml_diff>
--- a/3ПКС-120/_Сети_Лаб_/Лаб_7_ТарасовИльяЮрьевич_3ПКС-120.pptx
+++ b/3ПКС-120/_Сети_Лаб_/Лаб_7_ТарасовИльяЮрьевич_3ПКС-120.pptx
@@ -111,6 +111,11 @@
       </a:defRPr>
     </a:lvl9pPr>
   </p:defaultTextStyle>
+  <p:extLst>
+    <p:ext uri="{EFAFB233-063F-42B5-8137-9DF3F51BA10A}">
+      <p15:sldGuideLst xmlns:p15="http://schemas.microsoft.com/office/powerpoint/2012/main"/>
+    </p:ext>
+  </p:extLst>
 </p:presentation>
 </file>
 
@@ -449,7 +454,7 @@
           <a:p>
             <a:fld id="{3D9A7808-FE8F-4B3F-B32B-5493B6892530}" type="datetimeFigureOut">
               <a:rPr lang="ru-RU" smtClean="0"/>
-              <a:t>06.02.2023</a:t>
+              <a:t>05.10.2023</a:t>
             </a:fld>
             <a:endParaRPr lang="ru-RU"/>
           </a:p>
@@ -1537,7 +1542,7 @@
           <a:p>
             <a:fld id="{3D9A7808-FE8F-4B3F-B32B-5493B6892530}" type="datetimeFigureOut">
               <a:rPr lang="ru-RU" smtClean="0"/>
-              <a:t>06.02.2023</a:t>
+              <a:t>05.10.2023</a:t>
             </a:fld>
             <a:endParaRPr lang="ru-RU"/>
           </a:p>
@@ -2517,7 +2522,7 @@
           <a:p>
             <a:fld id="{3D9A7808-FE8F-4B3F-B32B-5493B6892530}" type="datetimeFigureOut">
               <a:rPr lang="ru-RU" smtClean="0"/>
-              <a:t>06.02.2023</a:t>
+              <a:t>05.10.2023</a:t>
             </a:fld>
             <a:endParaRPr lang="ru-RU"/>
           </a:p>
@@ -3651,7 +3656,7 @@
           <a:p>
             <a:fld id="{3D9A7808-FE8F-4B3F-B32B-5493B6892530}" type="datetimeFigureOut">
               <a:rPr lang="ru-RU" smtClean="0"/>
-              <a:t>06.02.2023</a:t>
+              <a:t>05.10.2023</a:t>
             </a:fld>
             <a:endParaRPr lang="ru-RU"/>
           </a:p>
@@ -4684,7 +4689,7 @@
           <a:p>
             <a:fld id="{3D9A7808-FE8F-4B3F-B32B-5493B6892530}" type="datetimeFigureOut">
               <a:rPr lang="ru-RU" smtClean="0"/>
-              <a:t>06.02.2023</a:t>
+              <a:t>05.10.2023</a:t>
             </a:fld>
             <a:endParaRPr lang="ru-RU"/>
           </a:p>
@@ -5344,7 +5349,7 @@
           <a:p>
             <a:fld id="{3D9A7808-FE8F-4B3F-B32B-5493B6892530}" type="datetimeFigureOut">
               <a:rPr lang="ru-RU" smtClean="0"/>
-              <a:t>06.02.2023</a:t>
+              <a:t>05.10.2023</a:t>
             </a:fld>
             <a:endParaRPr lang="ru-RU"/>
           </a:p>
@@ -6205,7 +6210,7 @@
           <a:p>
             <a:fld id="{3D9A7808-FE8F-4B3F-B32B-5493B6892530}" type="datetimeFigureOut">
               <a:rPr lang="ru-RU" smtClean="0"/>
-              <a:t>06.02.2023</a:t>
+              <a:t>05.10.2023</a:t>
             </a:fld>
             <a:endParaRPr lang="ru-RU"/>
           </a:p>
@@ -6395,7 +6400,7 @@
           <a:p>
             <a:fld id="{3D9A7808-FE8F-4B3F-B32B-5493B6892530}" type="datetimeFigureOut">
               <a:rPr lang="ru-RU" smtClean="0"/>
-              <a:t>06.02.2023</a:t>
+              <a:t>05.10.2023</a:t>
             </a:fld>
             <a:endParaRPr lang="ru-RU"/>
           </a:p>
@@ -7367,7 +7372,7 @@
           <a:p>
             <a:fld id="{3D9A7808-FE8F-4B3F-B32B-5493B6892530}" type="datetimeFigureOut">
               <a:rPr lang="ru-RU" smtClean="0"/>
-              <a:t>06.02.2023</a:t>
+              <a:t>05.10.2023</a:t>
             </a:fld>
             <a:endParaRPr lang="ru-RU"/>
           </a:p>
@@ -7578,7 +7583,7 @@
           <a:p>
             <a:fld id="{3D9A7808-FE8F-4B3F-B32B-5493B6892530}" type="datetimeFigureOut">
               <a:rPr lang="ru-RU" smtClean="0"/>
-              <a:t>06.02.2023</a:t>
+              <a:t>05.10.2023</a:t>
             </a:fld>
             <a:endParaRPr lang="ru-RU"/>
           </a:p>
@@ -8612,7 +8617,7 @@
           <a:p>
             <a:fld id="{3D9A7808-FE8F-4B3F-B32B-5493B6892530}" type="datetimeFigureOut">
               <a:rPr lang="ru-RU" smtClean="0"/>
-              <a:t>06.02.2023</a:t>
+              <a:t>05.10.2023</a:t>
             </a:fld>
             <a:endParaRPr lang="ru-RU"/>
           </a:p>
@@ -8884,7 +8889,7 @@
           <a:p>
             <a:fld id="{3D9A7808-FE8F-4B3F-B32B-5493B6892530}" type="datetimeFigureOut">
               <a:rPr lang="ru-RU" smtClean="0"/>
-              <a:t>06.02.2023</a:t>
+              <a:t>05.10.2023</a:t>
             </a:fld>
             <a:endParaRPr lang="ru-RU"/>
           </a:p>
@@ -9294,7 +9299,7 @@
           <a:p>
             <a:fld id="{3D9A7808-FE8F-4B3F-B32B-5493B6892530}" type="datetimeFigureOut">
               <a:rPr lang="ru-RU" smtClean="0"/>
-              <a:t>06.02.2023</a:t>
+              <a:t>05.10.2023</a:t>
             </a:fld>
             <a:endParaRPr lang="ru-RU"/>
           </a:p>
@@ -9421,7 +9426,7 @@
           <a:p>
             <a:fld id="{3D9A7808-FE8F-4B3F-B32B-5493B6892530}" type="datetimeFigureOut">
               <a:rPr lang="ru-RU" smtClean="0"/>
-              <a:t>06.02.2023</a:t>
+              <a:t>05.10.2023</a:t>
             </a:fld>
             <a:endParaRPr lang="ru-RU"/>
           </a:p>
@@ -9516,7 +9521,7 @@
           <a:p>
             <a:fld id="{3D9A7808-FE8F-4B3F-B32B-5493B6892530}" type="datetimeFigureOut">
               <a:rPr lang="ru-RU" smtClean="0"/>
-              <a:t>06.02.2023</a:t>
+              <a:t>05.10.2023</a:t>
             </a:fld>
             <a:endParaRPr lang="ru-RU"/>
           </a:p>
@@ -10597,7 +10602,7 @@
           <a:p>
             <a:fld id="{3D9A7808-FE8F-4B3F-B32B-5493B6892530}" type="datetimeFigureOut">
               <a:rPr lang="ru-RU" smtClean="0"/>
-              <a:t>06.02.2023</a:t>
+              <a:t>05.10.2023</a:t>
             </a:fld>
             <a:endParaRPr lang="ru-RU"/>
           </a:p>
@@ -11705,7 +11710,7 @@
           <a:p>
             <a:fld id="{3D9A7808-FE8F-4B3F-B32B-5493B6892530}" type="datetimeFigureOut">
               <a:rPr lang="ru-RU" smtClean="0"/>
-              <a:t>06.02.2023</a:t>
+              <a:t>05.10.2023</a:t>
             </a:fld>
             <a:endParaRPr lang="ru-RU"/>
           </a:p>
@@ -12702,7 +12707,7 @@
           <a:p>
             <a:fld id="{3D9A7808-FE8F-4B3F-B32B-5493B6892530}" type="datetimeFigureOut">
               <a:rPr lang="ru-RU" smtClean="0"/>
-              <a:t>06.02.2023</a:t>
+              <a:t>05.10.2023</a:t>
             </a:fld>
             <a:endParaRPr lang="ru-RU"/>
           </a:p>
@@ -13266,7 +13271,7 @@
           <p:cNvPr id="2" name="Заголовок 1">
             <a:extLst>
               <a:ext uri="{FF2B5EF4-FFF2-40B4-BE49-F238E27FC236}">
-                <a16:creationId xmlns:a16="http://schemas.microsoft.com/office/drawing/2014/main" id="{6E6905B8-F0A1-4D12-B856-223AC7E97BE4}"/>
+                <a16:creationId xmlns:a16="http://schemas.microsoft.com/office/drawing/2014/main" xmlns="" id="{6E6905B8-F0A1-4D12-B856-223AC7E97BE4}"/>
               </a:ext>
             </a:extLst>
           </p:cNvPr>
@@ -13313,7 +13318,7 @@
           <p:cNvPr id="3" name="Подзаголовок 2">
             <a:extLst>
               <a:ext uri="{FF2B5EF4-FFF2-40B4-BE49-F238E27FC236}">
-                <a16:creationId xmlns:a16="http://schemas.microsoft.com/office/drawing/2014/main" id="{412C5B2C-C62C-489D-9029-E9102BF13CF9}"/>
+                <a16:creationId xmlns:a16="http://schemas.microsoft.com/office/drawing/2014/main" xmlns="" id="{412C5B2C-C62C-489D-9029-E9102BF13CF9}"/>
               </a:ext>
             </a:extLst>
           </p:cNvPr>
@@ -13391,7 +13396,7 @@
           <p:cNvPr id="2" name="Заголовок 1">
             <a:extLst>
               <a:ext uri="{FF2B5EF4-FFF2-40B4-BE49-F238E27FC236}">
-                <a16:creationId xmlns:a16="http://schemas.microsoft.com/office/drawing/2014/main" id="{8DAB936E-CD10-42E4-92C0-38AD690A1594}"/>
+                <a16:creationId xmlns:a16="http://schemas.microsoft.com/office/drawing/2014/main" xmlns="" id="{8DAB936E-CD10-42E4-92C0-38AD690A1594}"/>
               </a:ext>
             </a:extLst>
           </p:cNvPr>
@@ -13424,7 +13429,7 @@
           <p:cNvPr id="3" name="Объект 2">
             <a:extLst>
               <a:ext uri="{FF2B5EF4-FFF2-40B4-BE49-F238E27FC236}">
-                <a16:creationId xmlns:a16="http://schemas.microsoft.com/office/drawing/2014/main" id="{32D75781-6F68-4C1B-B431-FDE35044F9DE}"/>
+                <a16:creationId xmlns:a16="http://schemas.microsoft.com/office/drawing/2014/main" xmlns="" id="{32D75781-6F68-4C1B-B431-FDE35044F9DE}"/>
               </a:ext>
             </a:extLst>
           </p:cNvPr>
@@ -13529,7 +13534,7 @@
           <p:cNvPr id="5" name="Рисунок 4">
             <a:extLst>
               <a:ext uri="{FF2B5EF4-FFF2-40B4-BE49-F238E27FC236}">
-                <a16:creationId xmlns:a16="http://schemas.microsoft.com/office/drawing/2014/main" id="{3EBDD471-60E4-40BA-A47D-5401BC93FB3A}"/>
+                <a16:creationId xmlns:a16="http://schemas.microsoft.com/office/drawing/2014/main" xmlns="" id="{3EBDD471-60E4-40BA-A47D-5401BC93FB3A}"/>
               </a:ext>
             </a:extLst>
           </p:cNvPr>
@@ -13589,7 +13594,7 @@
           <p:cNvPr id="2" name="Заголовок 1">
             <a:extLst>
               <a:ext uri="{FF2B5EF4-FFF2-40B4-BE49-F238E27FC236}">
-                <a16:creationId xmlns:a16="http://schemas.microsoft.com/office/drawing/2014/main" id="{6A83CDF5-3765-4686-B023-F9CDDB41E9E6}"/>
+                <a16:creationId xmlns:a16="http://schemas.microsoft.com/office/drawing/2014/main" xmlns="" id="{6A83CDF5-3765-4686-B023-F9CDDB41E9E6}"/>
               </a:ext>
             </a:extLst>
           </p:cNvPr>
@@ -13630,7 +13635,7 @@
           <p:cNvPr id="3" name="Объект 2">
             <a:extLst>
               <a:ext uri="{FF2B5EF4-FFF2-40B4-BE49-F238E27FC236}">
-                <a16:creationId xmlns:a16="http://schemas.microsoft.com/office/drawing/2014/main" id="{2C4ABCE8-F69F-4971-9609-478AC2B2303B}"/>
+                <a16:creationId xmlns:a16="http://schemas.microsoft.com/office/drawing/2014/main" xmlns="" id="{2C4ABCE8-F69F-4971-9609-478AC2B2303B}"/>
               </a:ext>
             </a:extLst>
           </p:cNvPr>
@@ -13674,7 +13679,7 @@
           <p:cNvPr id="5" name="Рисунок 4">
             <a:extLst>
               <a:ext uri="{FF2B5EF4-FFF2-40B4-BE49-F238E27FC236}">
-                <a16:creationId xmlns:a16="http://schemas.microsoft.com/office/drawing/2014/main" id="{BC74CAD5-218C-4816-BB73-E0BA188BD757}"/>
+                <a16:creationId xmlns:a16="http://schemas.microsoft.com/office/drawing/2014/main" xmlns="" id="{BC74CAD5-218C-4816-BB73-E0BA188BD757}"/>
               </a:ext>
             </a:extLst>
           </p:cNvPr>
@@ -13704,7 +13709,7 @@
           <p:cNvPr id="6" name="TextBox 5">
             <a:extLst>
               <a:ext uri="{FF2B5EF4-FFF2-40B4-BE49-F238E27FC236}">
-                <a16:creationId xmlns:a16="http://schemas.microsoft.com/office/drawing/2014/main" id="{CC6896EA-279D-4794-8C69-89C7F8B68207}"/>
+                <a16:creationId xmlns:a16="http://schemas.microsoft.com/office/drawing/2014/main" xmlns="" id="{CC6896EA-279D-4794-8C69-89C7F8B68207}"/>
               </a:ext>
             </a:extLst>
           </p:cNvPr>
@@ -13795,7 +13800,7 @@
           <p:cNvPr id="2" name="Заголовок 1">
             <a:extLst>
               <a:ext uri="{FF2B5EF4-FFF2-40B4-BE49-F238E27FC236}">
-                <a16:creationId xmlns:a16="http://schemas.microsoft.com/office/drawing/2014/main" id="{05B6D1B6-C4BC-49DC-9F0A-D3E2F15AD36E}"/>
+                <a16:creationId xmlns:a16="http://schemas.microsoft.com/office/drawing/2014/main" xmlns="" id="{05B6D1B6-C4BC-49DC-9F0A-D3E2F15AD36E}"/>
               </a:ext>
             </a:extLst>
           </p:cNvPr>
@@ -13828,7 +13833,7 @@
           <p:cNvPr id="3" name="Объект 2">
             <a:extLst>
               <a:ext uri="{FF2B5EF4-FFF2-40B4-BE49-F238E27FC236}">
-                <a16:creationId xmlns:a16="http://schemas.microsoft.com/office/drawing/2014/main" id="{021E5FA3-E54F-41AB-A152-B280E722CA14}"/>
+                <a16:creationId xmlns:a16="http://schemas.microsoft.com/office/drawing/2014/main" xmlns="" id="{021E5FA3-E54F-41AB-A152-B280E722CA14}"/>
               </a:ext>
             </a:extLst>
           </p:cNvPr>
@@ -13907,7 +13912,7 @@
           <p:cNvPr id="5" name="Рисунок 4">
             <a:extLst>
               <a:ext uri="{FF2B5EF4-FFF2-40B4-BE49-F238E27FC236}">
-                <a16:creationId xmlns:a16="http://schemas.microsoft.com/office/drawing/2014/main" id="{21F7A408-0E10-4808-8F5A-433FDF778916}"/>
+                <a16:creationId xmlns:a16="http://schemas.microsoft.com/office/drawing/2014/main" xmlns="" id="{21F7A408-0E10-4808-8F5A-433FDF778916}"/>
               </a:ext>
             </a:extLst>
           </p:cNvPr>
@@ -13967,7 +13972,7 @@
           <p:cNvPr id="2" name="Заголовок 1">
             <a:extLst>
               <a:ext uri="{FF2B5EF4-FFF2-40B4-BE49-F238E27FC236}">
-                <a16:creationId xmlns:a16="http://schemas.microsoft.com/office/drawing/2014/main" id="{E8231EB3-7516-4871-9BE4-B5D47E1E715C}"/>
+                <a16:creationId xmlns:a16="http://schemas.microsoft.com/office/drawing/2014/main" xmlns="" id="{E8231EB3-7516-4871-9BE4-B5D47E1E715C}"/>
               </a:ext>
             </a:extLst>
           </p:cNvPr>
@@ -14005,7 +14010,7 @@
           <p:cNvPr id="3" name="Объект 2">
             <a:extLst>
               <a:ext uri="{FF2B5EF4-FFF2-40B4-BE49-F238E27FC236}">
-                <a16:creationId xmlns:a16="http://schemas.microsoft.com/office/drawing/2014/main" id="{2E95A6D8-F9EC-411E-867E-6961E1E5F4B4}"/>
+                <a16:creationId xmlns:a16="http://schemas.microsoft.com/office/drawing/2014/main" xmlns="" id="{2E95A6D8-F9EC-411E-867E-6961E1E5F4B4}"/>
               </a:ext>
             </a:extLst>
           </p:cNvPr>
@@ -14235,7 +14240,7 @@
           <p:cNvPr id="2" name="Заголовок 1">
             <a:extLst>
               <a:ext uri="{FF2B5EF4-FFF2-40B4-BE49-F238E27FC236}">
-                <a16:creationId xmlns:a16="http://schemas.microsoft.com/office/drawing/2014/main" id="{E8231EB3-7516-4871-9BE4-B5D47E1E715C}"/>
+                <a16:creationId xmlns:a16="http://schemas.microsoft.com/office/drawing/2014/main" xmlns="" id="{E8231EB3-7516-4871-9BE4-B5D47E1E715C}"/>
               </a:ext>
             </a:extLst>
           </p:cNvPr>
@@ -14273,7 +14278,7 @@
           <p:cNvPr id="3" name="Объект 2">
             <a:extLst>
               <a:ext uri="{FF2B5EF4-FFF2-40B4-BE49-F238E27FC236}">
-                <a16:creationId xmlns:a16="http://schemas.microsoft.com/office/drawing/2014/main" id="{2E95A6D8-F9EC-411E-867E-6961E1E5F4B4}"/>
+                <a16:creationId xmlns:a16="http://schemas.microsoft.com/office/drawing/2014/main" xmlns="" id="{2E95A6D8-F9EC-411E-867E-6961E1E5F4B4}"/>
               </a:ext>
             </a:extLst>
           </p:cNvPr>
@@ -14639,7 +14644,7 @@
           <p:cNvPr id="2" name="Заголовок 1">
             <a:extLst>
               <a:ext uri="{FF2B5EF4-FFF2-40B4-BE49-F238E27FC236}">
-                <a16:creationId xmlns:a16="http://schemas.microsoft.com/office/drawing/2014/main" id="{83190BD4-585D-4EEB-AB36-5E8F355D52F8}"/>
+                <a16:creationId xmlns:a16="http://schemas.microsoft.com/office/drawing/2014/main" xmlns="" id="{83190BD4-585D-4EEB-AB36-5E8F355D52F8}"/>
               </a:ext>
             </a:extLst>
           </p:cNvPr>
@@ -14672,7 +14677,7 @@
           <p:cNvPr id="5" name="Рисунок 4">
             <a:extLst>
               <a:ext uri="{FF2B5EF4-FFF2-40B4-BE49-F238E27FC236}">
-                <a16:creationId xmlns:a16="http://schemas.microsoft.com/office/drawing/2014/main" id="{04178AD9-A85F-4966-AB2C-00E163B943A3}"/>
+                <a16:creationId xmlns:a16="http://schemas.microsoft.com/office/drawing/2014/main" xmlns="" id="{04178AD9-A85F-4966-AB2C-00E163B943A3}"/>
               </a:ext>
             </a:extLst>
           </p:cNvPr>
@@ -14702,7 +14707,7 @@
           <p:cNvPr id="6" name="TextBox 5">
             <a:extLst>
               <a:ext uri="{FF2B5EF4-FFF2-40B4-BE49-F238E27FC236}">
-                <a16:creationId xmlns:a16="http://schemas.microsoft.com/office/drawing/2014/main" id="{7C4CAD94-0A1C-4789-AC2C-90A39C8F9FE4}"/>
+                <a16:creationId xmlns:a16="http://schemas.microsoft.com/office/drawing/2014/main" xmlns="" id="{7C4CAD94-0A1C-4789-AC2C-90A39C8F9FE4}"/>
               </a:ext>
             </a:extLst>
           </p:cNvPr>
@@ -14792,7 +14797,7 @@
           <p:cNvPr id="2" name="Заголовок 1">
             <a:extLst>
               <a:ext uri="{FF2B5EF4-FFF2-40B4-BE49-F238E27FC236}">
-                <a16:creationId xmlns:a16="http://schemas.microsoft.com/office/drawing/2014/main" id="{6E6905B8-F0A1-4D12-B856-223AC7E97BE4}"/>
+                <a16:creationId xmlns:a16="http://schemas.microsoft.com/office/drawing/2014/main" xmlns="" id="{6E6905B8-F0A1-4D12-B856-223AC7E97BE4}"/>
               </a:ext>
             </a:extLst>
           </p:cNvPr>

</xml_diff>